<commit_message>
Fix example on the backtrace with debug symbols slide
</commit_message>
<xml_diff>
--- a/ZeroNights2015/Cross-platform reversing with Frida.pptx
+++ b/ZeroNights2015/Cross-platform reversing with Frida.pptx
@@ -233,7 +233,7 @@
           <a:p>
             <a:fld id="{38371BAB-13F9-AE44-A055-0F382FC6E3AF}" type="datetimeFigureOut">
               <a:rPr lang="en-US" smtClean="0"/>
-              <a:t>11/23/15</a:t>
+              <a:t>12/13/15</a:t>
             </a:fld>
             <a:endParaRPr lang="en-US" dirty="0"/>
           </a:p>
@@ -3719,7 +3719,7 @@
           <a:p>
             <a:fld id="{C6D34833-1BBC-4C81-B52F-2C529CD37D23}" type="datetimeFigureOut">
               <a:rPr lang="ru-RU" smtClean="0"/>
-              <a:t>23.11.15</a:t>
+              <a:t>13.12.15</a:t>
             </a:fld>
             <a:endParaRPr lang="ru-RU" dirty="0"/>
           </a:p>
@@ -3889,7 +3889,7 @@
           <a:p>
             <a:fld id="{C6D34833-1BBC-4C81-B52F-2C529CD37D23}" type="datetimeFigureOut">
               <a:rPr lang="ru-RU" smtClean="0"/>
-              <a:t>23.11.15</a:t>
+              <a:t>13.12.15</a:t>
             </a:fld>
             <a:endParaRPr lang="ru-RU" dirty="0"/>
           </a:p>
@@ -4069,7 +4069,7 @@
           <a:p>
             <a:fld id="{C6D34833-1BBC-4C81-B52F-2C529CD37D23}" type="datetimeFigureOut">
               <a:rPr lang="ru-RU" smtClean="0"/>
-              <a:t>23.11.15</a:t>
+              <a:t>13.12.15</a:t>
             </a:fld>
             <a:endParaRPr lang="ru-RU" dirty="0"/>
           </a:p>
@@ -4239,7 +4239,7 @@
           <a:p>
             <a:fld id="{C6D34833-1BBC-4C81-B52F-2C529CD37D23}" type="datetimeFigureOut">
               <a:rPr lang="ru-RU" smtClean="0"/>
-              <a:t>23.11.15</a:t>
+              <a:t>13.12.15</a:t>
             </a:fld>
             <a:endParaRPr lang="ru-RU" dirty="0"/>
           </a:p>
@@ -4485,7 +4485,7 @@
           <a:p>
             <a:fld id="{C6D34833-1BBC-4C81-B52F-2C529CD37D23}" type="datetimeFigureOut">
               <a:rPr lang="ru-RU" smtClean="0"/>
-              <a:t>23.11.15</a:t>
+              <a:t>13.12.15</a:t>
             </a:fld>
             <a:endParaRPr lang="ru-RU" dirty="0"/>
           </a:p>
@@ -4717,7 +4717,7 @@
           <a:p>
             <a:fld id="{C6D34833-1BBC-4C81-B52F-2C529CD37D23}" type="datetimeFigureOut">
               <a:rPr lang="ru-RU" smtClean="0"/>
-              <a:t>23.11.15</a:t>
+              <a:t>13.12.15</a:t>
             </a:fld>
             <a:endParaRPr lang="ru-RU" dirty="0"/>
           </a:p>
@@ -5084,7 +5084,7 @@
           <a:p>
             <a:fld id="{C6D34833-1BBC-4C81-B52F-2C529CD37D23}" type="datetimeFigureOut">
               <a:rPr lang="ru-RU" smtClean="0"/>
-              <a:t>23.11.15</a:t>
+              <a:t>13.12.15</a:t>
             </a:fld>
             <a:endParaRPr lang="ru-RU" dirty="0"/>
           </a:p>
@@ -5202,7 +5202,7 @@
           <a:p>
             <a:fld id="{C6D34833-1BBC-4C81-B52F-2C529CD37D23}" type="datetimeFigureOut">
               <a:rPr lang="ru-RU" smtClean="0"/>
-              <a:t>23.11.15</a:t>
+              <a:t>13.12.15</a:t>
             </a:fld>
             <a:endParaRPr lang="ru-RU" dirty="0"/>
           </a:p>
@@ -5297,7 +5297,7 @@
           <a:p>
             <a:fld id="{C6D34833-1BBC-4C81-B52F-2C529CD37D23}" type="datetimeFigureOut">
               <a:rPr lang="ru-RU" smtClean="0"/>
-              <a:t>23.11.15</a:t>
+              <a:t>13.12.15</a:t>
             </a:fld>
             <a:endParaRPr lang="ru-RU" dirty="0"/>
           </a:p>
@@ -5574,7 +5574,7 @@
           <a:p>
             <a:fld id="{C6D34833-1BBC-4C81-B52F-2C529CD37D23}" type="datetimeFigureOut">
               <a:rPr lang="ru-RU" smtClean="0"/>
-              <a:t>23.11.15</a:t>
+              <a:t>13.12.15</a:t>
             </a:fld>
             <a:endParaRPr lang="ru-RU" dirty="0"/>
           </a:p>
@@ -5827,7 +5827,7 @@
           <a:p>
             <a:fld id="{C6D34833-1BBC-4C81-B52F-2C529CD37D23}" type="datetimeFigureOut">
               <a:rPr lang="ru-RU" smtClean="0"/>
-              <a:t>23.11.15</a:t>
+              <a:t>13.12.15</a:t>
             </a:fld>
             <a:endParaRPr lang="ru-RU" dirty="0"/>
           </a:p>
@@ -6040,7 +6040,7 @@
           <a:p>
             <a:fld id="{C6D34833-1BBC-4C81-B52F-2C529CD37D23}" type="datetimeFigureOut">
               <a:rPr lang="ru-RU" smtClean="0"/>
-              <a:t>23.11.15</a:t>
+              <a:t>13.12.15</a:t>
             </a:fld>
             <a:endParaRPr lang="ru-RU" dirty="0"/>
           </a:p>
@@ -6566,42 +6566,14 @@
                 <a:latin typeface="Arial" panose="020B0604020202020204" pitchFamily="34" charset="0"/>
                 <a:cs typeface="Arial" panose="020B0604020202020204" pitchFamily="34" charset="0"/>
               </a:rPr>
-              <a:t>Ole </a:t>
-            </a:r>
-            <a:r>
-              <a:rPr lang="en-US" dirty="0" smtClean="0">
-                <a:latin typeface="Arial" panose="020B0604020202020204" pitchFamily="34" charset="0"/>
-                <a:cs typeface="Arial" panose="020B0604020202020204" pitchFamily="34" charset="0"/>
-              </a:rPr>
-              <a:t>Andr</a:t>
+              <a:t>Ole Andr</a:t>
             </a:r>
             <a:r>
               <a:rPr lang="nb-NO" dirty="0" smtClean="0">
                 <a:latin typeface="Arial" panose="020B0604020202020204" pitchFamily="34" charset="0"/>
                 <a:cs typeface="Arial" panose="020B0604020202020204" pitchFamily="34" charset="0"/>
               </a:rPr>
-              <a:t>é</a:t>
-            </a:r>
-            <a:r>
-              <a:rPr lang="nb-NO" dirty="0" smtClean="0">
-                <a:latin typeface="Arial" panose="020B0604020202020204" pitchFamily="34" charset="0"/>
-                <a:cs typeface="Arial" panose="020B0604020202020204" pitchFamily="34" charset="0"/>
-              </a:rPr>
-              <a:t> </a:t>
-            </a:r>
-            <a:r>
-              <a:rPr lang="nb-NO" dirty="0" smtClean="0">
-                <a:latin typeface="Arial" panose="020B0604020202020204" pitchFamily="34" charset="0"/>
-                <a:cs typeface="Arial" panose="020B0604020202020204" pitchFamily="34" charset="0"/>
-              </a:rPr>
-              <a:t>Vadla</a:t>
-            </a:r>
-            <a:r>
-              <a:rPr lang="nb-NO" dirty="0" smtClean="0">
-                <a:latin typeface="Arial" panose="020B0604020202020204" pitchFamily="34" charset="0"/>
-                <a:cs typeface="Arial" panose="020B0604020202020204" pitchFamily="34" charset="0"/>
-              </a:rPr>
-              <a:t> Ravnås</a:t>
+              <a:t>é Vadla Ravnås</a:t>
             </a:r>
             <a:endParaRPr lang="ru-RU" dirty="0">
               <a:latin typeface="Arial" panose="020B0604020202020204" pitchFamily="34" charset="0"/>
@@ -28119,6 +28091,17 @@
                 <a:ea typeface="Consolas" charset="0"/>
                 <a:cs typeface="Consolas" charset="0"/>
               </a:rPr>
+              <a:t>    </a:t>
+            </a:r>
+            <a:r>
+              <a:rPr lang="en-US" sz="1200" dirty="0" smtClean="0">
+                <a:solidFill>
+                  <a:schemeClr val="bg1"/>
+                </a:solidFill>
+                <a:latin typeface="Consolas" charset="0"/>
+                <a:ea typeface="Consolas" charset="0"/>
+                <a:cs typeface="Consolas" charset="0"/>
+              </a:rPr>
               <a:t>    Thread.backtrace(</a:t>
             </a:r>
             <a:r>
@@ -28152,7 +28135,29 @@
                 <a:ea typeface="Consolas" charset="0"/>
                 <a:cs typeface="Consolas" charset="0"/>
               </a:rPr>
-              <a:t>, Backtracer.ACCURATE).join(</a:t>
+              <a:t>, Backtracer.ACCURATE</a:t>
+            </a:r>
+            <a:r>
+              <a:rPr lang="en-US" sz="1200" dirty="0" smtClean="0">
+                <a:solidFill>
+                  <a:schemeClr val="bg1"/>
+                </a:solidFill>
+                <a:latin typeface="Consolas" charset="0"/>
+                <a:ea typeface="Consolas" charset="0"/>
+                <a:cs typeface="Consolas" charset="0"/>
+              </a:rPr>
+              <a:t>).</a:t>
+            </a:r>
+            <a:r>
+              <a:rPr lang="en-US" sz="1200" dirty="0">
+                <a:solidFill>
+                  <a:schemeClr val="bg1"/>
+                </a:solidFill>
+                <a:latin typeface="Consolas" charset="0"/>
+                <a:ea typeface="Consolas" charset="0"/>
+                <a:cs typeface="Consolas" charset="0"/>
+              </a:rPr>
+              <a:t>join(</a:t>
             </a:r>
             <a:r>
               <a:rPr lang="en-US" sz="1200" dirty="0">
@@ -28468,7 +28473,7 @@
         <p:spPr>
           <a:xfrm>
             <a:off x="601687" y="1998363"/>
-            <a:ext cx="6812280" cy="1569660"/>
+            <a:ext cx="6812280" cy="1938992"/>
           </a:xfrm>
           <a:prstGeom prst="rect">
             <a:avLst/>
@@ -28716,6 +28721,17 @@
                 <a:ea typeface="Consolas" charset="0"/>
                 <a:cs typeface="Consolas" charset="0"/>
               </a:rPr>
+              <a:t>    </a:t>
+            </a:r>
+            <a:r>
+              <a:rPr lang="en-US" sz="1200" dirty="0" smtClean="0">
+                <a:solidFill>
+                  <a:schemeClr val="bg1"/>
+                </a:solidFill>
+                <a:latin typeface="Consolas" charset="0"/>
+                <a:ea typeface="Consolas" charset="0"/>
+                <a:cs typeface="Consolas" charset="0"/>
+              </a:rPr>
               <a:t>    Thread.backtrace(</a:t>
             </a:r>
             <a:r>
@@ -28749,7 +28765,107 @@
                 <a:ea typeface="Consolas" charset="0"/>
                 <a:cs typeface="Consolas" charset="0"/>
               </a:rPr>
-              <a:t>, Backtracer.ACCURATE).join(</a:t>
+              <a:t>, Backtracer.ACCURATE</a:t>
+            </a:r>
+            <a:r>
+              <a:rPr lang="en-US" sz="1200" dirty="0" smtClean="0">
+                <a:solidFill>
+                  <a:schemeClr val="bg1"/>
+                </a:solidFill>
+                <a:latin typeface="Consolas" charset="0"/>
+                <a:ea typeface="Consolas" charset="0"/>
+                <a:cs typeface="Consolas" charset="0"/>
+              </a:rPr>
+              <a:t>)</a:t>
+            </a:r>
+          </a:p>
+          <a:p>
+            <a:r>
+              <a:rPr lang="en-US" sz="1200" dirty="0">
+                <a:solidFill>
+                  <a:schemeClr val="bg1"/>
+                </a:solidFill>
+                <a:latin typeface="Consolas" charset="0"/>
+                <a:ea typeface="Consolas" charset="0"/>
+                <a:cs typeface="Consolas" charset="0"/>
+              </a:rPr>
+              <a:t>        </a:t>
+            </a:r>
+            <a:r>
+              <a:rPr lang="en-US" sz="1200" dirty="0" smtClean="0">
+                <a:solidFill>
+                  <a:schemeClr val="bg1"/>
+                </a:solidFill>
+                <a:latin typeface="Consolas" charset="0"/>
+                <a:ea typeface="Consolas" charset="0"/>
+                <a:cs typeface="Consolas" charset="0"/>
+              </a:rPr>
+              <a:t>    .</a:t>
+            </a:r>
+            <a:r>
+              <a:rPr lang="en-US" sz="1200" dirty="0">
+                <a:solidFill>
+                  <a:schemeClr val="bg1"/>
+                </a:solidFill>
+                <a:latin typeface="Consolas" charset="0"/>
+                <a:ea typeface="Consolas" charset="0"/>
+                <a:cs typeface="Consolas" charset="0"/>
+              </a:rPr>
+              <a:t>map(DebugSymbol.fromAddress)</a:t>
+            </a:r>
+            <a:endParaRPr lang="en-US" sz="1200" dirty="0" smtClean="0">
+              <a:solidFill>
+                <a:schemeClr val="bg1"/>
+              </a:solidFill>
+              <a:latin typeface="Consolas" charset="0"/>
+              <a:ea typeface="Consolas" charset="0"/>
+              <a:cs typeface="Consolas" charset="0"/>
+            </a:endParaRPr>
+          </a:p>
+          <a:p>
+            <a:r>
+              <a:rPr lang="en-US" sz="1200" dirty="0">
+                <a:solidFill>
+                  <a:schemeClr val="bg1"/>
+                </a:solidFill>
+                <a:latin typeface="Consolas" charset="0"/>
+                <a:ea typeface="Consolas" charset="0"/>
+                <a:cs typeface="Consolas" charset="0"/>
+              </a:rPr>
+              <a:t> </a:t>
+            </a:r>
+            <a:r>
+              <a:rPr lang="en-US" sz="1200" dirty="0" smtClean="0">
+                <a:solidFill>
+                  <a:schemeClr val="bg1"/>
+                </a:solidFill>
+                <a:latin typeface="Consolas" charset="0"/>
+                <a:ea typeface="Consolas" charset="0"/>
+                <a:cs typeface="Consolas" charset="0"/>
+              </a:rPr>
+              <a:t>           </a:t>
+            </a:r>
+            <a:r>
+              <a:rPr lang="en-US" sz="1200" dirty="0" smtClean="0">
+                <a:solidFill>
+                  <a:schemeClr val="bg1"/>
+                </a:solidFill>
+                <a:latin typeface="Consolas" charset="0"/>
+                <a:ea typeface="Consolas" charset="0"/>
+                <a:cs typeface="Consolas" charset="0"/>
+              </a:rPr>
+              <a:t>.</a:t>
+            </a:r>
+            <a:r>
+              <a:rPr lang="en-US" sz="1200" dirty="0">
+                <a:solidFill>
+                  <a:schemeClr val="bg1"/>
+                </a:solidFill>
+                <a:latin typeface="Consolas" charset="0"/>
+                <a:ea typeface="Consolas" charset="0"/>
+                <a:cs typeface="Consolas" charset="0"/>
+              </a:rPr>
+              <a:t>join(</a:t>
             </a:r>
             <a:r>
               <a:rPr lang="en-US" sz="1200" dirty="0">
@@ -28848,7 +28964,7 @@
         </p:nvSpPr>
         <p:spPr>
           <a:xfrm>
-            <a:off x="3872204" y="3932829"/>
+            <a:off x="3872204" y="4138569"/>
             <a:ext cx="7819769" cy="1569660"/>
           </a:xfrm>
           <a:prstGeom prst="rect">
@@ -33293,18 +33409,7 @@
                 <a:ea typeface="Consolas" charset="0"/>
                 <a:cs typeface="Consolas" charset="0"/>
               </a:rPr>
-              <a:t>#include &lt;</a:t>
-            </a:r>
-            <a:r>
-              <a:rPr lang="en-US" sz="1200" dirty="0">
-                <a:solidFill>
-                  <a:srgbClr val="CB4B16"/>
-                </a:solidFill>
-                <a:latin typeface="Consolas" charset="0"/>
-                <a:ea typeface="Consolas" charset="0"/>
-                <a:cs typeface="Consolas" charset="0"/>
-              </a:rPr>
-              <a:t>stdio.h</a:t>
+              <a:t>#include &lt;stdio.h</a:t>
             </a:r>
             <a:r>
               <a:rPr lang="en-US" sz="1200" dirty="0" smtClean="0">
@@ -33358,18 +33463,7 @@
                 <a:ea typeface="Consolas" charset="0"/>
                 <a:cs typeface="Consolas" charset="0"/>
               </a:rPr>
-              <a:t>unistd.h</a:t>
-            </a:r>
-            <a:r>
-              <a:rPr lang="en-US" sz="1200" dirty="0" smtClean="0">
-                <a:solidFill>
-                  <a:srgbClr val="CB4B16"/>
-                </a:solidFill>
-                <a:latin typeface="Consolas" charset="0"/>
-                <a:ea typeface="Consolas" charset="0"/>
-                <a:cs typeface="Consolas" charset="0"/>
-              </a:rPr>
-              <a:t>&gt;</a:t>
+              <a:t>unistd.h&gt;</a:t>
             </a:r>
             <a:endParaRPr lang="en-US" sz="1200" dirty="0" smtClean="0">
               <a:solidFill>
@@ -34113,29 +34207,7 @@
                 <a:ea typeface="Consolas" charset="0"/>
                 <a:cs typeface="Consolas" charset="0"/>
               </a:rPr>
-              <a:t>$ clang </a:t>
-            </a:r>
-            <a:r>
-              <a:rPr lang="en-US" sz="1200" dirty="0">
-                <a:solidFill>
-                  <a:srgbClr val="DDDDDD"/>
-                </a:solidFill>
-                <a:latin typeface="Consolas" charset="0"/>
-                <a:ea typeface="Consolas" charset="0"/>
-                <a:cs typeface="Consolas" charset="0"/>
-              </a:rPr>
-              <a:t>hello.c</a:t>
-            </a:r>
-            <a:r>
-              <a:rPr lang="en-US" sz="1200" dirty="0">
-                <a:solidFill>
-                  <a:srgbClr val="DDDDDD"/>
-                </a:solidFill>
-                <a:latin typeface="Consolas" charset="0"/>
-                <a:ea typeface="Consolas" charset="0"/>
-                <a:cs typeface="Consolas" charset="0"/>
-              </a:rPr>
-              <a:t> -o </a:t>
+              <a:t>$ clang hello.c -o </a:t>
             </a:r>
             <a:r>
               <a:rPr lang="en-US" sz="1200" dirty="0" smtClean="0">
@@ -36796,18 +36868,7 @@
                 <a:ea typeface="Consolas" charset="0"/>
                 <a:cs typeface="Consolas" charset="0"/>
               </a:rPr>
-              <a:t>on_message</a:t>
-            </a:r>
-            <a:r>
-              <a:rPr lang="en-US" sz="1200" dirty="0" smtClean="0">
-                <a:solidFill>
-                  <a:srgbClr val="839496"/>
-                </a:solidFill>
-                <a:latin typeface="Consolas" charset="0"/>
-                <a:ea typeface="Consolas" charset="0"/>
-                <a:cs typeface="Consolas" charset="0"/>
-              </a:rPr>
-              <a:t>)</a:t>
+              <a:t>on_message)</a:t>
             </a:r>
           </a:p>
           <a:p>

</xml_diff>